<commit_message>
atualizei a minha parte do slide
</commit_message>
<xml_diff>
--- a/Documentação/chameleon.pptx
+++ b/Documentação/chameleon.pptx
@@ -309,7 +309,7 @@
           <a:p>
             <a:fld id="{BD136F2D-A4D6-49ED-BC18-D450E2FF51EC}" type="slidenum">
               <a:rPr lang="pt-BR" smtClean="0"/>
-              <a:t>‹nº›</a:t>
+              <a:t>‹n.º›</a:t>
             </a:fld>
             <a:endParaRPr lang="pt-BR"/>
           </a:p>
@@ -477,7 +477,7 @@
           <a:p>
             <a:fld id="{BD136F2D-A4D6-49ED-BC18-D450E2FF51EC}" type="slidenum">
               <a:rPr lang="pt-BR" smtClean="0"/>
-              <a:t>‹nº›</a:t>
+              <a:t>‹n.º›</a:t>
             </a:fld>
             <a:endParaRPr lang="pt-BR"/>
           </a:p>
@@ -655,7 +655,7 @@
           <a:p>
             <a:fld id="{BD136F2D-A4D6-49ED-BC18-D450E2FF51EC}" type="slidenum">
               <a:rPr lang="pt-BR" smtClean="0"/>
-              <a:t>‹nº›</a:t>
+              <a:t>‹n.º›</a:t>
             </a:fld>
             <a:endParaRPr lang="pt-BR"/>
           </a:p>
@@ -823,7 +823,7 @@
           <a:p>
             <a:fld id="{BD136F2D-A4D6-49ED-BC18-D450E2FF51EC}" type="slidenum">
               <a:rPr lang="pt-BR" smtClean="0"/>
-              <a:t>‹nº›</a:t>
+              <a:t>‹n.º›</a:t>
             </a:fld>
             <a:endParaRPr lang="pt-BR"/>
           </a:p>
@@ -1068,7 +1068,7 @@
           <a:p>
             <a:fld id="{BD136F2D-A4D6-49ED-BC18-D450E2FF51EC}" type="slidenum">
               <a:rPr lang="pt-BR" smtClean="0"/>
-              <a:t>‹nº›</a:t>
+              <a:t>‹n.º›</a:t>
             </a:fld>
             <a:endParaRPr lang="pt-BR"/>
           </a:p>
@@ -1297,7 +1297,7 @@
           <a:p>
             <a:fld id="{BD136F2D-A4D6-49ED-BC18-D450E2FF51EC}" type="slidenum">
               <a:rPr lang="pt-BR" smtClean="0"/>
-              <a:t>‹nº›</a:t>
+              <a:t>‹n.º›</a:t>
             </a:fld>
             <a:endParaRPr lang="pt-BR"/>
           </a:p>
@@ -1661,7 +1661,7 @@
           <a:p>
             <a:fld id="{BD136F2D-A4D6-49ED-BC18-D450E2FF51EC}" type="slidenum">
               <a:rPr lang="pt-BR" smtClean="0"/>
-              <a:t>‹nº›</a:t>
+              <a:t>‹n.º›</a:t>
             </a:fld>
             <a:endParaRPr lang="pt-BR"/>
           </a:p>
@@ -1778,7 +1778,7 @@
           <a:p>
             <a:fld id="{BD136F2D-A4D6-49ED-BC18-D450E2FF51EC}" type="slidenum">
               <a:rPr lang="pt-BR" smtClean="0"/>
-              <a:t>‹nº›</a:t>
+              <a:t>‹n.º›</a:t>
             </a:fld>
             <a:endParaRPr lang="pt-BR"/>
           </a:p>
@@ -1873,7 +1873,7 @@
           <a:p>
             <a:fld id="{BD136F2D-A4D6-49ED-BC18-D450E2FF51EC}" type="slidenum">
               <a:rPr lang="pt-BR" smtClean="0"/>
-              <a:t>‹nº›</a:t>
+              <a:t>‹n.º›</a:t>
             </a:fld>
             <a:endParaRPr lang="pt-BR"/>
           </a:p>
@@ -2148,7 +2148,7 @@
           <a:p>
             <a:fld id="{BD136F2D-A4D6-49ED-BC18-D450E2FF51EC}" type="slidenum">
               <a:rPr lang="pt-BR" smtClean="0"/>
-              <a:t>‹nº›</a:t>
+              <a:t>‹n.º›</a:t>
             </a:fld>
             <a:endParaRPr lang="pt-BR"/>
           </a:p>
@@ -2400,7 +2400,7 @@
           <a:p>
             <a:fld id="{BD136F2D-A4D6-49ED-BC18-D450E2FF51EC}" type="slidenum">
               <a:rPr lang="pt-BR" smtClean="0"/>
-              <a:t>‹nº›</a:t>
+              <a:t>‹n.º›</a:t>
             </a:fld>
             <a:endParaRPr lang="pt-BR"/>
           </a:p>
@@ -2647,7 +2647,7 @@
           <a:p>
             <a:fld id="{BD136F2D-A4D6-49ED-BC18-D450E2FF51EC}" type="slidenum">
               <a:rPr lang="pt-BR" smtClean="0"/>
-              <a:t>‹nº›</a:t>
+              <a:t>‹n.º›</a:t>
             </a:fld>
             <a:endParaRPr lang="pt-BR"/>
           </a:p>
@@ -2979,7 +2979,7 @@
           <p:cNvPr id="2" name="Título 1">
             <a:extLst>
               <a:ext uri="{FF2B5EF4-FFF2-40B4-BE49-F238E27FC236}">
-                <a16:creationId xmlns:a16="http://schemas.microsoft.com/office/drawing/2014/main" id="{99F76FBE-1BC2-4EE6-B90A-22263BF7BDCD}"/>
+                <a16:creationId xmlns:a16="http://schemas.microsoft.com/office/drawing/2014/main" xmlns="" id="{99F76FBE-1BC2-4EE6-B90A-22263BF7BDCD}"/>
               </a:ext>
             </a:extLst>
           </p:cNvPr>
@@ -3015,7 +3015,7 @@
           <p:cNvPr id="8" name="CaixaDeTexto 7">
             <a:extLst>
               <a:ext uri="{FF2B5EF4-FFF2-40B4-BE49-F238E27FC236}">
-                <a16:creationId xmlns:a16="http://schemas.microsoft.com/office/drawing/2014/main" id="{B8325861-1F2F-4268-ABB8-C47708A22645}"/>
+                <a16:creationId xmlns:a16="http://schemas.microsoft.com/office/drawing/2014/main" xmlns="" id="{B8325861-1F2F-4268-ABB8-C47708A22645}"/>
               </a:ext>
             </a:extLst>
           </p:cNvPr>
@@ -3062,7 +3062,7 @@
           <p:cNvPr id="9" name="CaixaDeTexto 8">
             <a:extLst>
               <a:ext uri="{FF2B5EF4-FFF2-40B4-BE49-F238E27FC236}">
-                <a16:creationId xmlns:a16="http://schemas.microsoft.com/office/drawing/2014/main" id="{C1CD548A-80ED-4522-9EDB-054404B21EE9}"/>
+                <a16:creationId xmlns:a16="http://schemas.microsoft.com/office/drawing/2014/main" xmlns="" id="{C1CD548A-80ED-4522-9EDB-054404B21EE9}"/>
               </a:ext>
             </a:extLst>
           </p:cNvPr>
@@ -3109,7 +3109,7 @@
           <p:cNvPr id="10" name="CaixaDeTexto 9">
             <a:extLst>
               <a:ext uri="{FF2B5EF4-FFF2-40B4-BE49-F238E27FC236}">
-                <a16:creationId xmlns:a16="http://schemas.microsoft.com/office/drawing/2014/main" id="{A943B0FE-F317-47B4-AF95-1BF63C89F003}"/>
+                <a16:creationId xmlns:a16="http://schemas.microsoft.com/office/drawing/2014/main" xmlns="" id="{A943B0FE-F317-47B4-AF95-1BF63C89F003}"/>
               </a:ext>
             </a:extLst>
           </p:cNvPr>
@@ -3134,11 +3134,14 @@
           <a:p>
             <a:pPr algn="ctr"/>
             <a:r>
-              <a:rPr lang="pt-BR" sz="2800" dirty="0">
+              <a:rPr lang="pt-BR" sz="2800" dirty="0" smtClean="0">
                 <a:latin typeface="Bariol Bold" panose="02000506040000020003" pitchFamily="2" charset="0"/>
               </a:rPr>
-              <a:t>Giselle</a:t>
-            </a:r>
+              <a:t>Gisele</a:t>
+            </a:r>
+            <a:endParaRPr lang="pt-BR" sz="2800" dirty="0">
+              <a:latin typeface="Bariol Bold" panose="02000506040000020003" pitchFamily="2" charset="0"/>
+            </a:endParaRPr>
           </a:p>
           <a:p>
             <a:pPr algn="ctr"/>
@@ -3156,7 +3159,7 @@
           <p:cNvPr id="11" name="CaixaDeTexto 10">
             <a:extLst>
               <a:ext uri="{FF2B5EF4-FFF2-40B4-BE49-F238E27FC236}">
-                <a16:creationId xmlns:a16="http://schemas.microsoft.com/office/drawing/2014/main" id="{79D4990C-EB5C-46BD-906D-1D4B714A6937}"/>
+                <a16:creationId xmlns:a16="http://schemas.microsoft.com/office/drawing/2014/main" xmlns="" id="{79D4990C-EB5C-46BD-906D-1D4B714A6937}"/>
               </a:ext>
             </a:extLst>
           </p:cNvPr>
@@ -3206,7 +3209,7 @@
           <p:cNvPr id="12" name="CaixaDeTexto 11">
             <a:extLst>
               <a:ext uri="{FF2B5EF4-FFF2-40B4-BE49-F238E27FC236}">
-                <a16:creationId xmlns:a16="http://schemas.microsoft.com/office/drawing/2014/main" id="{3EEDA333-49AA-47A1-9E18-27FCA69C6ADA}"/>
+                <a16:creationId xmlns:a16="http://schemas.microsoft.com/office/drawing/2014/main" xmlns="" id="{3EEDA333-49AA-47A1-9E18-27FCA69C6ADA}"/>
               </a:ext>
             </a:extLst>
           </p:cNvPr>
@@ -3286,7 +3289,7 @@
           <p:cNvPr id="16" name="CaixaDeTexto 15">
             <a:extLst>
               <a:ext uri="{FF2B5EF4-FFF2-40B4-BE49-F238E27FC236}">
-                <a16:creationId xmlns:a16="http://schemas.microsoft.com/office/drawing/2014/main" id="{3EEDA333-49AA-47A1-9E18-27FCA69C6ADA}"/>
+                <a16:creationId xmlns:a16="http://schemas.microsoft.com/office/drawing/2014/main" xmlns="" id="{3EEDA333-49AA-47A1-9E18-27FCA69C6ADA}"/>
               </a:ext>
             </a:extLst>
           </p:cNvPr>
@@ -3483,7 +3486,7 @@
           <p:cNvPr id="5" name="Imagem 4" descr="Homem com óculos de grau e camisa preta&#10;&#10;Descrição gerada automaticamente">
             <a:extLst>
               <a:ext uri="{FF2B5EF4-FFF2-40B4-BE49-F238E27FC236}">
-                <a16:creationId xmlns:a16="http://schemas.microsoft.com/office/drawing/2014/main" id="{D815F394-F527-4EF6-8095-041600C68E39}"/>
+                <a16:creationId xmlns:a16="http://schemas.microsoft.com/office/drawing/2014/main" xmlns="" id="{D815F394-F527-4EF6-8095-041600C68E39}"/>
               </a:ext>
             </a:extLst>
           </p:cNvPr>
@@ -5150,7 +5153,7 @@
           <p:cNvPr id="2" name="Título 1">
             <a:extLst>
               <a:ext uri="{FF2B5EF4-FFF2-40B4-BE49-F238E27FC236}">
-                <a16:creationId xmlns:a16="http://schemas.microsoft.com/office/drawing/2014/main" id="{99F76FBE-1BC2-4EE6-B90A-22263BF7BDCD}"/>
+                <a16:creationId xmlns:a16="http://schemas.microsoft.com/office/drawing/2014/main" xmlns="" id="{99F76FBE-1BC2-4EE6-B90A-22263BF7BDCD}"/>
               </a:ext>
             </a:extLst>
           </p:cNvPr>
@@ -5246,7 +5249,7 @@
           <p:cNvPr id="5" name="CaixaDeTexto 4">
             <a:extLst>
               <a:ext uri="{FF2B5EF4-FFF2-40B4-BE49-F238E27FC236}">
-                <a16:creationId xmlns:a16="http://schemas.microsoft.com/office/drawing/2014/main" id="{869545E3-DC46-4CDB-A839-CA8AA4E80E78}"/>
+                <a16:creationId xmlns:a16="http://schemas.microsoft.com/office/drawing/2014/main" xmlns="" id="{869545E3-DC46-4CDB-A839-CA8AA4E80E78}"/>
               </a:ext>
             </a:extLst>
           </p:cNvPr>
@@ -5636,7 +5639,7 @@
           <p:cNvPr id="2" name="Título 1">
             <a:extLst>
               <a:ext uri="{FF2B5EF4-FFF2-40B4-BE49-F238E27FC236}">
-                <a16:creationId xmlns:a16="http://schemas.microsoft.com/office/drawing/2014/main" id="{99F76FBE-1BC2-4EE6-B90A-22263BF7BDCD}"/>
+                <a16:creationId xmlns:a16="http://schemas.microsoft.com/office/drawing/2014/main" xmlns="" id="{99F76FBE-1BC2-4EE6-B90A-22263BF7BDCD}"/>
               </a:ext>
             </a:extLst>
           </p:cNvPr>
@@ -5913,7 +5916,7 @@
           <p:cNvPr id="6" name="Título 1">
             <a:extLst>
               <a:ext uri="{FF2B5EF4-FFF2-40B4-BE49-F238E27FC236}">
-                <a16:creationId xmlns:a16="http://schemas.microsoft.com/office/drawing/2014/main" id="{99F76FBE-1BC2-4EE6-B90A-22263BF7BDCD}"/>
+                <a16:creationId xmlns:a16="http://schemas.microsoft.com/office/drawing/2014/main" xmlns="" id="{99F76FBE-1BC2-4EE6-B90A-22263BF7BDCD}"/>
               </a:ext>
             </a:extLst>
           </p:cNvPr>
@@ -6429,7 +6432,7 @@
           <p:cNvPr id="7" name="Título 1">
             <a:extLst>
               <a:ext uri="{FF2B5EF4-FFF2-40B4-BE49-F238E27FC236}">
-                <a16:creationId xmlns:a16="http://schemas.microsoft.com/office/drawing/2014/main" id="{99F76FBE-1BC2-4EE6-B90A-22263BF7BDCD}"/>
+                <a16:creationId xmlns:a16="http://schemas.microsoft.com/office/drawing/2014/main" xmlns="" id="{99F76FBE-1BC2-4EE6-B90A-22263BF7BDCD}"/>
               </a:ext>
             </a:extLst>
           </p:cNvPr>
@@ -6960,7 +6963,7 @@
           <p:cNvPr id="2" name="Título 1">
             <a:extLst>
               <a:ext uri="{FF2B5EF4-FFF2-40B4-BE49-F238E27FC236}">
-                <a16:creationId xmlns:a16="http://schemas.microsoft.com/office/drawing/2014/main" id="{99F76FBE-1BC2-4EE6-B90A-22263BF7BDCD}"/>
+                <a16:creationId xmlns:a16="http://schemas.microsoft.com/office/drawing/2014/main" xmlns="" id="{99F76FBE-1BC2-4EE6-B90A-22263BF7BDCD}"/>
               </a:ext>
             </a:extLst>
           </p:cNvPr>
@@ -7061,7 +7064,7 @@
           <p:cNvPr id="11" name="CaixaDeTexto 10">
             <a:extLst>
               <a:ext uri="{FF2B5EF4-FFF2-40B4-BE49-F238E27FC236}">
-                <a16:creationId xmlns:a16="http://schemas.microsoft.com/office/drawing/2014/main" id="{869545E3-DC46-4CDB-A839-CA8AA4E80E78}"/>
+                <a16:creationId xmlns:a16="http://schemas.microsoft.com/office/drawing/2014/main" xmlns="" id="{869545E3-DC46-4CDB-A839-CA8AA4E80E78}"/>
               </a:ext>
             </a:extLst>
           </p:cNvPr>
@@ -7301,7 +7304,7 @@
           <p:cNvPr id="2" name="Título 1">
             <a:extLst>
               <a:ext uri="{FF2B5EF4-FFF2-40B4-BE49-F238E27FC236}">
-                <a16:creationId xmlns:a16="http://schemas.microsoft.com/office/drawing/2014/main" id="{99F76FBE-1BC2-4EE6-B90A-22263BF7BDCD}"/>
+                <a16:creationId xmlns:a16="http://schemas.microsoft.com/office/drawing/2014/main" xmlns="" id="{99F76FBE-1BC2-4EE6-B90A-22263BF7BDCD}"/>
               </a:ext>
             </a:extLst>
           </p:cNvPr>
@@ -7312,7 +7315,12 @@
             <p:ph type="title"/>
           </p:nvPr>
         </p:nvSpPr>
-        <p:spPr/>
+        <p:spPr>
+          <a:xfrm>
+            <a:off x="838200" y="186999"/>
+            <a:ext cx="10515600" cy="1325563"/>
+          </a:xfrm>
+        </p:spPr>
         <p:txBody>
           <a:bodyPr/>
           <a:lstStyle/>
@@ -7384,7 +7392,7 @@
         </p:blipFill>
         <p:spPr>
           <a:xfrm>
-            <a:off x="7716172" y="3846172"/>
+            <a:off x="8001177" y="3846172"/>
             <a:ext cx="4244942" cy="3011828"/>
           </a:xfrm>
           <a:prstGeom prst="rect">
@@ -7397,7 +7405,7 @@
           <p:cNvPr id="5" name="CaixaDeTexto 4">
             <a:extLst>
               <a:ext uri="{FF2B5EF4-FFF2-40B4-BE49-F238E27FC236}">
-                <a16:creationId xmlns:a16="http://schemas.microsoft.com/office/drawing/2014/main" id="{869545E3-DC46-4CDB-A839-CA8AA4E80E78}"/>
+                <a16:creationId xmlns:a16="http://schemas.microsoft.com/office/drawing/2014/main" xmlns="" id="{869545E3-DC46-4CDB-A839-CA8AA4E80E78}"/>
               </a:ext>
             </a:extLst>
           </p:cNvPr>
@@ -7406,8 +7414,8 @@
         </p:nvSpPr>
         <p:spPr>
           <a:xfrm>
-            <a:off x="838200" y="2274838"/>
-            <a:ext cx="5995851" cy="2677656"/>
+            <a:off x="719446" y="1614268"/>
+            <a:ext cx="5995851" cy="1938992"/>
           </a:xfrm>
           <a:prstGeom prst="rect">
             <a:avLst/>
@@ -7444,7 +7452,7 @@
               <a:rPr lang="pt-BR" sz="2400" dirty="0" smtClean="0">
                 <a:latin typeface="Bariol Bold" panose="02000506040000020003" pitchFamily="2" charset="0"/>
               </a:rPr>
-              <a:t>ar.</a:t>
+              <a:t>ar;</a:t>
             </a:r>
             <a:endParaRPr lang="pt-BR" sz="2400" dirty="0">
               <a:latin typeface="Bariol Bold" panose="02000506040000020003" pitchFamily="2" charset="0"/>
@@ -7482,79 +7490,35 @@
               <a:rPr lang="pt-BR" sz="2400" dirty="0" smtClean="0">
                 <a:latin typeface="Bariol Bold" panose="02000506040000020003" pitchFamily="2" charset="0"/>
               </a:rPr>
-              <a:t>Fungos </a:t>
+              <a:t>Favorecimento da proliferação de </a:t>
             </a:r>
             <a:r>
               <a:rPr lang="pt-BR" sz="2400" dirty="0">
                 <a:latin typeface="Bariol Bold" panose="02000506040000020003" pitchFamily="2" charset="0"/>
               </a:rPr>
-              <a:t>e </a:t>
+              <a:t>f</a:t>
             </a:r>
             <a:r>
               <a:rPr lang="pt-BR" sz="2400" dirty="0" smtClean="0">
                 <a:latin typeface="Bariol Bold" panose="02000506040000020003" pitchFamily="2" charset="0"/>
               </a:rPr>
-              <a:t>bactérias </a:t>
+              <a:t>ungos </a:t>
             </a:r>
             <a:r>
               <a:rPr lang="pt-BR" sz="2400" dirty="0">
                 <a:latin typeface="Bariol Bold" panose="02000506040000020003" pitchFamily="2" charset="0"/>
               </a:rPr>
-              <a:t>causam </a:t>
+              <a:t>e </a:t>
             </a:r>
             <a:r>
               <a:rPr lang="pt-BR" sz="2400" dirty="0" smtClean="0">
                 <a:latin typeface="Bariol Bold" panose="02000506040000020003" pitchFamily="2" charset="0"/>
               </a:rPr>
-              <a:t>variáveis </a:t>
-            </a:r>
-            <a:r>
-              <a:rPr lang="pt-BR" sz="2400" dirty="0">
-                <a:latin typeface="Bariol Bold" panose="02000506040000020003" pitchFamily="2" charset="0"/>
-              </a:rPr>
-              <a:t>doenças</a:t>
-            </a:r>
-            <a:r>
-              <a:rPr lang="pt-BR" sz="2400" dirty="0" smtClean="0">
-                <a:latin typeface="Bariol Bold" panose="02000506040000020003" pitchFamily="2" charset="0"/>
-              </a:rPr>
-              <a:t>.</a:t>
-            </a:r>
-          </a:p>
-          <a:p>
-            <a:pPr marL="342900" indent="-342900">
-              <a:buClr>
-                <a:srgbClr val="35B794"/>
-              </a:buClr>
-              <a:buSzPct val="80000"/>
-              <a:buFont typeface="Wingdings" panose="05000000000000000000" pitchFamily="2" charset="2"/>
-              <a:buChar char="ü"/>
-            </a:pPr>
+              <a:t>bactérias nocivos a saúde humana;</a:t>
+            </a:r>
             <a:endParaRPr lang="pt-BR" sz="2400" dirty="0">
               <a:latin typeface="Bariol Bold" panose="02000506040000020003" pitchFamily="2" charset="0"/>
             </a:endParaRPr>
-          </a:p>
-          <a:p>
-            <a:pPr marL="342900" indent="-342900">
-              <a:buClr>
-                <a:srgbClr val="35B794"/>
-              </a:buClr>
-              <a:buSzPct val="80000"/>
-              <a:buFont typeface="Wingdings" panose="05000000000000000000" pitchFamily="2" charset="2"/>
-              <a:buChar char="ü"/>
-            </a:pPr>
-            <a:r>
-              <a:rPr lang="pt-BR" sz="2400" dirty="0" smtClean="0">
-                <a:latin typeface="Bariol Bold" panose="02000506040000020003" pitchFamily="2" charset="0"/>
-              </a:rPr>
-              <a:t>Mofo pode </a:t>
-            </a:r>
-            <a:r>
-              <a:rPr lang="pt-BR" sz="2400" dirty="0">
-                <a:latin typeface="Bariol Bold" panose="02000506040000020003" pitchFamily="2" charset="0"/>
-              </a:rPr>
-              <a:t>causar uma variedade de doenças respiratórias nos seres humanos.</a:t>
-            </a:r>
           </a:p>
         </p:txBody>
       </p:sp>
@@ -7580,7 +7544,7 @@
         </p:blipFill>
         <p:spPr>
           <a:xfrm rot="16200000">
-            <a:off x="8996544" y="1326975"/>
+            <a:off x="8830293" y="1326975"/>
             <a:ext cx="1684198" cy="2054720"/>
           </a:xfrm>
           <a:prstGeom prst="rect">
@@ -7588,6 +7552,157 @@
           </a:prstGeom>
         </p:spPr>
       </p:pic>
+      <p:pic>
+        <p:nvPicPr>
+          <p:cNvPr id="1026" name="Picture 2" descr="| Josué Teixeira/Gazeta do Povo"/>
+          <p:cNvPicPr>
+            <a:picLocks noChangeAspect="1" noChangeArrowheads="1"/>
+          </p:cNvPicPr>
+          <p:nvPr/>
+        </p:nvPicPr>
+        <p:blipFill>
+          <a:blip r:embed="rId5">
+            <a:extLst>
+              <a:ext uri="{28A0092B-C50C-407E-A947-70E740481C1C}">
+                <a14:useLocalDpi xmlns:a14="http://schemas.microsoft.com/office/drawing/2010/main" val="0"/>
+              </a:ext>
+            </a:extLst>
+          </a:blip>
+          <a:srcRect/>
+          <a:stretch>
+            <a:fillRect/>
+          </a:stretch>
+        </p:blipFill>
+        <p:spPr bwMode="auto">
+          <a:xfrm>
+            <a:off x="778818" y="3846172"/>
+            <a:ext cx="4125686" cy="2750457"/>
+          </a:xfrm>
+          <a:prstGeom prst="rect">
+            <a:avLst/>
+          </a:prstGeom>
+          <a:noFill/>
+          <a:extLst>
+            <a:ext uri="{909E8E84-426E-40DD-AFC4-6F175D3DCCD1}">
+              <a14:hiddenFill xmlns:a14="http://schemas.microsoft.com/office/drawing/2010/main">
+                <a:solidFill>
+                  <a:srgbClr val="FFFFFF"/>
+                </a:solidFill>
+              </a14:hiddenFill>
+            </a:ext>
+          </a:extLst>
+        </p:spPr>
+      </p:pic>
+      <p:sp>
+        <p:nvSpPr>
+          <p:cNvPr id="4" name="CaixaDeTexto 3"/>
+          <p:cNvSpPr txBox="1"/>
+          <p:nvPr/>
+        </p:nvSpPr>
+        <p:spPr>
+          <a:xfrm>
+            <a:off x="4975759" y="5229590"/>
+            <a:ext cx="2899063" cy="1384995"/>
+          </a:xfrm>
+          <a:prstGeom prst="rect">
+            <a:avLst/>
+          </a:prstGeom>
+          <a:noFill/>
+        </p:spPr>
+        <p:txBody>
+          <a:bodyPr wrap="none" rtlCol="0">
+            <a:spAutoFit/>
+          </a:bodyPr>
+          <a:lstStyle/>
+          <a:p>
+            <a:r>
+              <a:rPr lang="pt-BR" sz="1200" b="1" dirty="0"/>
+              <a:t>Biblioteca municipal de </a:t>
+            </a:r>
+          </a:p>
+          <a:p>
+            <a:r>
+              <a:rPr lang="pt-BR" sz="1200" b="1" dirty="0"/>
+              <a:t>Ponta Grossa </a:t>
+            </a:r>
+            <a:r>
+              <a:rPr lang="mr-IN" sz="1200" b="1" dirty="0"/>
+              <a:t>–</a:t>
+            </a:r>
+            <a:r>
+              <a:rPr lang="pt-BR" sz="1200" b="1" dirty="0"/>
+              <a:t> </a:t>
+            </a:r>
+            <a:r>
+              <a:rPr lang="pt-BR" sz="1200" b="1" dirty="0" smtClean="0"/>
+              <a:t>Paraná</a:t>
+            </a:r>
+          </a:p>
+          <a:p>
+            <a:r>
+              <a:rPr lang="pt-BR" sz="1200" dirty="0" smtClean="0"/>
+              <a:t>- De 35 mil obras, 20 mil foram incineradas </a:t>
+            </a:r>
+          </a:p>
+          <a:p>
+            <a:r>
+              <a:rPr lang="pt-BR" sz="1200" dirty="0" smtClean="0"/>
+              <a:t>por estarem contaminadas por fungos.</a:t>
+            </a:r>
+          </a:p>
+          <a:p>
+            <a:endParaRPr lang="pt-BR" sz="1200" dirty="0" smtClean="0"/>
+          </a:p>
+          <a:p>
+            <a:r>
+              <a:rPr lang="pt-BR" sz="1200" dirty="0" smtClean="0"/>
+              <a:t>Fonte: </a:t>
+            </a:r>
+            <a:r>
+              <a:rPr lang="pt-BR" sz="1200" dirty="0">
+                <a:solidFill>
+                  <a:schemeClr val="accent6">
+                    <a:lumMod val="75000"/>
+                  </a:schemeClr>
+                </a:solidFill>
+                <a:hlinkClick r:id="rId6"/>
+              </a:rPr>
+              <a:t>http://g1.globo.com/pr</a:t>
+            </a:r>
+            <a:r>
+              <a:rPr lang="pt-BR" sz="1200" dirty="0" smtClean="0">
+                <a:solidFill>
+                  <a:schemeClr val="accent6">
+                    <a:lumMod val="75000"/>
+                  </a:schemeClr>
+                </a:solidFill>
+                <a:hlinkClick r:id="rId6"/>
+              </a:rPr>
+              <a:t>/</a:t>
+            </a:r>
+          </a:p>
+          <a:p>
+            <a:r>
+              <a:rPr lang="pt-BR" sz="1200" dirty="0" smtClean="0">
+                <a:solidFill>
+                  <a:schemeClr val="accent6">
+                    <a:lumMod val="75000"/>
+                  </a:schemeClr>
+                </a:solidFill>
+                <a:hlinkClick r:id="rId6"/>
+              </a:rPr>
+              <a:t>campos-gerais-sul</a:t>
+            </a:r>
+            <a:endParaRPr lang="pt-BR" sz="1200" dirty="0" smtClean="0">
+              <a:solidFill>
+                <a:schemeClr val="accent6">
+                  <a:lumMod val="75000"/>
+                </a:schemeClr>
+              </a:solidFill>
+            </a:endParaRPr>
+          </a:p>
+        </p:txBody>
+      </p:sp>
     </p:spTree>
     <p:extLst>
       <p:ext uri="{BB962C8B-B14F-4D97-AF65-F5344CB8AC3E}">
@@ -7721,7 +7836,7 @@
           <p:cNvPr id="2" name="Título 1">
             <a:extLst>
               <a:ext uri="{FF2B5EF4-FFF2-40B4-BE49-F238E27FC236}">
-                <a16:creationId xmlns:a16="http://schemas.microsoft.com/office/drawing/2014/main" id="{99F76FBE-1BC2-4EE6-B90A-22263BF7BDCD}"/>
+                <a16:creationId xmlns:a16="http://schemas.microsoft.com/office/drawing/2014/main" xmlns="" id="{99F76FBE-1BC2-4EE6-B90A-22263BF7BDCD}"/>
               </a:ext>
             </a:extLst>
           </p:cNvPr>
@@ -7817,7 +7932,7 @@
           <p:cNvPr id="5" name="CaixaDeTexto 4">
             <a:extLst>
               <a:ext uri="{FF2B5EF4-FFF2-40B4-BE49-F238E27FC236}">
-                <a16:creationId xmlns:a16="http://schemas.microsoft.com/office/drawing/2014/main" id="{B1A9BA09-BC8C-4B52-AE69-EBE2FD7DC39C}"/>
+                <a16:creationId xmlns:a16="http://schemas.microsoft.com/office/drawing/2014/main" xmlns="" id="{B1A9BA09-BC8C-4B52-AE69-EBE2FD7DC39C}"/>
               </a:ext>
             </a:extLst>
           </p:cNvPr>
@@ -8088,7 +8203,7 @@
           <p:cNvPr id="6" name="Imagem 5" descr="Uma imagem contendo relógio&#10;&#10;Descrição gerada automaticamente">
             <a:extLst>
               <a:ext uri="{FF2B5EF4-FFF2-40B4-BE49-F238E27FC236}">
-                <a16:creationId xmlns:a16="http://schemas.microsoft.com/office/drawing/2014/main" id="{CB59938E-1EC6-4FDA-9A22-DB6A7DC30350}"/>
+                <a16:creationId xmlns:a16="http://schemas.microsoft.com/office/drawing/2014/main" xmlns="" id="{CB59938E-1EC6-4FDA-9A22-DB6A7DC30350}"/>
               </a:ext>
             </a:extLst>
           </p:cNvPr>
@@ -8157,7 +8272,7 @@
           <p:cNvPr id="11" name="Imagem 10" descr="Uma imagem contendo lego&#10;&#10;Descrição gerada automaticamente">
             <a:extLst>
               <a:ext uri="{FF2B5EF4-FFF2-40B4-BE49-F238E27FC236}">
-                <a16:creationId xmlns:a16="http://schemas.microsoft.com/office/drawing/2014/main" id="{75CCF98C-9716-4BFB-817E-3CAB031EC69E}"/>
+                <a16:creationId xmlns:a16="http://schemas.microsoft.com/office/drawing/2014/main" xmlns="" id="{75CCF98C-9716-4BFB-817E-3CAB031EC69E}"/>
               </a:ext>
             </a:extLst>
           </p:cNvPr>
@@ -8240,7 +8355,7 @@
           <p:cNvPr id="8" name="Imagem 7" descr="Uma imagem contendo relógio, mesa, computador, tela&#10;&#10;Descrição gerada automaticamente">
             <a:extLst>
               <a:ext uri="{FF2B5EF4-FFF2-40B4-BE49-F238E27FC236}">
-                <a16:creationId xmlns:a16="http://schemas.microsoft.com/office/drawing/2014/main" id="{CA5FBE93-39D7-43EB-BC2F-F7757B0AEB93}"/>
+                <a16:creationId xmlns:a16="http://schemas.microsoft.com/office/drawing/2014/main" xmlns="" id="{CA5FBE93-39D7-43EB-BC2F-F7757B0AEB93}"/>
               </a:ext>
             </a:extLst>
           </p:cNvPr>
@@ -8312,7 +8427,7 @@
           <p:cNvPr id="3" name="Imagem 2" descr="Texto preto sobre fundo branco&#10;&#10;Descrição gerada automaticamente">
             <a:extLst>
               <a:ext uri="{FF2B5EF4-FFF2-40B4-BE49-F238E27FC236}">
-                <a16:creationId xmlns:a16="http://schemas.microsoft.com/office/drawing/2014/main" id="{97EDB81F-85CF-4096-BBCE-16F66B59122E}"/>
+                <a16:creationId xmlns:a16="http://schemas.microsoft.com/office/drawing/2014/main" xmlns="" id="{97EDB81F-85CF-4096-BBCE-16F66B59122E}"/>
               </a:ext>
             </a:extLst>
           </p:cNvPr>
@@ -8629,7 +8744,7 @@
           <p:cNvPr id="7" name="Título 1">
             <a:extLst>
               <a:ext uri="{FF2B5EF4-FFF2-40B4-BE49-F238E27FC236}">
-                <a16:creationId xmlns:a16="http://schemas.microsoft.com/office/drawing/2014/main" id="{99F76FBE-1BC2-4EE6-B90A-22263BF7BDCD}"/>
+                <a16:creationId xmlns:a16="http://schemas.microsoft.com/office/drawing/2014/main" xmlns="" id="{99F76FBE-1BC2-4EE6-B90A-22263BF7BDCD}"/>
               </a:ext>
             </a:extLst>
           </p:cNvPr>
@@ -9058,7 +9173,7 @@
           <p:cNvPr id="8" name="Picture 6" descr="A close up of a logo&#10;&#10;Description generated with very high confidence">
             <a:extLst>
               <a:ext uri="{FF2B5EF4-FFF2-40B4-BE49-F238E27FC236}">
-                <a16:creationId xmlns:a16="http://schemas.microsoft.com/office/drawing/2014/main" id="{02FAD4E8-4127-4FD5-A86F-7066B5200CF9}"/>
+                <a16:creationId xmlns:a16="http://schemas.microsoft.com/office/drawing/2014/main" xmlns="" id="{02FAD4E8-4127-4FD5-A86F-7066B5200CF9}"/>
               </a:ext>
             </a:extLst>
           </p:cNvPr>
@@ -9088,7 +9203,7 @@
           <p:cNvPr id="9" name="Picture 2" descr="A close up of a logo&#10;&#10;Description generated with very high confidence">
             <a:extLst>
               <a:ext uri="{FF2B5EF4-FFF2-40B4-BE49-F238E27FC236}">
-                <a16:creationId xmlns:a16="http://schemas.microsoft.com/office/drawing/2014/main" id="{CF17E598-BC0F-433A-AACD-E985418FFF8F}"/>
+                <a16:creationId xmlns:a16="http://schemas.microsoft.com/office/drawing/2014/main" xmlns="" id="{CF17E598-BC0F-433A-AACD-E985418FFF8F}"/>
               </a:ext>
             </a:extLst>
           </p:cNvPr>
@@ -9118,7 +9233,7 @@
           <p:cNvPr id="10" name="Picture 8" descr="A circuit board&#10;&#10;Description generated with very high confidence">
             <a:extLst>
               <a:ext uri="{FF2B5EF4-FFF2-40B4-BE49-F238E27FC236}">
-                <a16:creationId xmlns:a16="http://schemas.microsoft.com/office/drawing/2014/main" id="{8631CDC9-C9ED-40D8-9718-9030D394E95F}"/>
+                <a16:creationId xmlns:a16="http://schemas.microsoft.com/office/drawing/2014/main" xmlns="" id="{8631CDC9-C9ED-40D8-9718-9030D394E95F}"/>
               </a:ext>
             </a:extLst>
           </p:cNvPr>
@@ -9148,7 +9263,7 @@
           <p:cNvPr id="11" name="Graphic 48" descr="Chevron arrows">
             <a:extLst>
               <a:ext uri="{FF2B5EF4-FFF2-40B4-BE49-F238E27FC236}">
-                <a16:creationId xmlns:a16="http://schemas.microsoft.com/office/drawing/2014/main" id="{9C83C282-EC67-4BF5-988C-C6151F03EAC8}"/>
+                <a16:creationId xmlns:a16="http://schemas.microsoft.com/office/drawing/2014/main" xmlns="" id="{9C83C282-EC67-4BF5-988C-C6151F03EAC8}"/>
               </a:ext>
             </a:extLst>
           </p:cNvPr>
@@ -9161,7 +9276,7 @@
           <a:blip r:embed="rId5">
             <a:extLst>
               <a:ext uri="{96DAC541-7B7A-43D3-8B79-37D633B846F1}">
-                <asvg:svgBlip xmlns:asvg="http://schemas.microsoft.com/office/drawing/2016/SVG/main" xmlns="" r:embed="rId6"/>
+                <asvg:svgBlip xmlns="" xmlns:asvg="http://schemas.microsoft.com/office/drawing/2016/SVG/main" r:embed="rId6"/>
               </a:ext>
             </a:extLst>
           </a:blip>
@@ -9184,7 +9299,7 @@
           <p:cNvPr id="12" name="Graphic 50" descr="Chevron arrows">
             <a:extLst>
               <a:ext uri="{FF2B5EF4-FFF2-40B4-BE49-F238E27FC236}">
-                <a16:creationId xmlns:a16="http://schemas.microsoft.com/office/drawing/2014/main" id="{F8ADD165-FA14-4184-A53E-48188D71E5FF}"/>
+                <a16:creationId xmlns:a16="http://schemas.microsoft.com/office/drawing/2014/main" xmlns="" id="{F8ADD165-FA14-4184-A53E-48188D71E5FF}"/>
               </a:ext>
             </a:extLst>
           </p:cNvPr>
@@ -9197,7 +9312,7 @@
           <a:blip r:embed="rId5">
             <a:extLst>
               <a:ext uri="{96DAC541-7B7A-43D3-8B79-37D633B846F1}">
-                <asvg:svgBlip xmlns:asvg="http://schemas.microsoft.com/office/drawing/2016/SVG/main" xmlns="" r:embed="rId6"/>
+                <asvg:svgBlip xmlns="" xmlns:asvg="http://schemas.microsoft.com/office/drawing/2016/SVG/main" r:embed="rId6"/>
               </a:ext>
             </a:extLst>
           </a:blip>
@@ -9220,7 +9335,7 @@
           <p:cNvPr id="13" name="Picture 52" descr="A close up of a logo&#10;&#10;Description generated with high confidence">
             <a:extLst>
               <a:ext uri="{FF2B5EF4-FFF2-40B4-BE49-F238E27FC236}">
-                <a16:creationId xmlns:a16="http://schemas.microsoft.com/office/drawing/2014/main" id="{09477861-B8F4-44DE-814A-58410BB781B9}"/>
+                <a16:creationId xmlns:a16="http://schemas.microsoft.com/office/drawing/2014/main" xmlns="" id="{09477861-B8F4-44DE-814A-58410BB781B9}"/>
               </a:ext>
             </a:extLst>
           </p:cNvPr>
@@ -9250,7 +9365,7 @@
           <p:cNvPr id="14" name="Picture 55" descr="A close up of a clock&#10;&#10;Description generated with high confidence">
             <a:extLst>
               <a:ext uri="{FF2B5EF4-FFF2-40B4-BE49-F238E27FC236}">
-                <a16:creationId xmlns:a16="http://schemas.microsoft.com/office/drawing/2014/main" id="{5C726E55-A6D4-4B74-8915-31B0312BC132}"/>
+                <a16:creationId xmlns:a16="http://schemas.microsoft.com/office/drawing/2014/main" xmlns="" id="{5C726E55-A6D4-4B74-8915-31B0312BC132}"/>
               </a:ext>
             </a:extLst>
           </p:cNvPr>
@@ -9409,7 +9524,7 @@
           <p:cNvPr id="18" name="Picture 37" descr="A picture containing computer, table&#10;&#10;Description generated with very high confidence">
             <a:extLst>
               <a:ext uri="{FF2B5EF4-FFF2-40B4-BE49-F238E27FC236}">
-                <a16:creationId xmlns:a16="http://schemas.microsoft.com/office/drawing/2014/main" id="{62574C71-6DE6-4BEE-A15F-55F806CE58A0}"/>
+                <a16:creationId xmlns:a16="http://schemas.microsoft.com/office/drawing/2014/main" xmlns="" id="{62574C71-6DE6-4BEE-A15F-55F806CE58A0}"/>
               </a:ext>
             </a:extLst>
           </p:cNvPr>
@@ -9951,7 +10066,7 @@
           <p:cNvPr id="21" name="Picture 30" descr="A close up of a device&#10;&#10;Description generated with very high confidence">
             <a:extLst>
               <a:ext uri="{FF2B5EF4-FFF2-40B4-BE49-F238E27FC236}">
-                <a16:creationId xmlns:a16="http://schemas.microsoft.com/office/drawing/2014/main" id="{64311C35-AE07-45F0-9E8D-286483932DBC}"/>
+                <a16:creationId xmlns:a16="http://schemas.microsoft.com/office/drawing/2014/main" xmlns="" id="{64311C35-AE07-45F0-9E8D-286483932DBC}"/>
               </a:ext>
             </a:extLst>
           </p:cNvPr>
@@ -9981,7 +10096,7 @@
           <p:cNvPr id="22" name="TextBox 33">
             <a:extLst>
               <a:ext uri="{FF2B5EF4-FFF2-40B4-BE49-F238E27FC236}">
-                <a16:creationId xmlns:a16="http://schemas.microsoft.com/office/drawing/2014/main" id="{46EBE350-3D70-431B-BFCA-8FAC071B45DB}"/>
+                <a16:creationId xmlns:a16="http://schemas.microsoft.com/office/drawing/2014/main" xmlns="" id="{46EBE350-3D70-431B-BFCA-8FAC071B45DB}"/>
               </a:ext>
             </a:extLst>
           </p:cNvPr>
@@ -10106,7 +10221,7 @@
           <p:cNvPr id="24" name="Picture 13" descr="A picture containing comb&#10;&#10;Description generated with very high confidence">
             <a:extLst>
               <a:ext uri="{FF2B5EF4-FFF2-40B4-BE49-F238E27FC236}">
-                <a16:creationId xmlns:a16="http://schemas.microsoft.com/office/drawing/2014/main" id="{96E322C2-909A-46BB-B588-211766AB85E0}"/>
+                <a16:creationId xmlns:a16="http://schemas.microsoft.com/office/drawing/2014/main" xmlns="" id="{96E322C2-909A-46BB-B588-211766AB85E0}"/>
               </a:ext>
             </a:extLst>
           </p:cNvPr>
@@ -10136,7 +10251,7 @@
           <p:cNvPr id="25" name="TextBox 61">
             <a:extLst>
               <a:ext uri="{FF2B5EF4-FFF2-40B4-BE49-F238E27FC236}">
-                <a16:creationId xmlns:a16="http://schemas.microsoft.com/office/drawing/2014/main" id="{2B0D8CBA-CC14-4E5F-B4F1-1633DDE93E6E}"/>
+                <a16:creationId xmlns:a16="http://schemas.microsoft.com/office/drawing/2014/main" xmlns="" id="{2B0D8CBA-CC14-4E5F-B4F1-1633DDE93E6E}"/>
               </a:ext>
             </a:extLst>
           </p:cNvPr>
@@ -10235,7 +10350,7 @@
           <p:cNvPr id="27" name="Picture 68" descr="A close up of a sign&#10;&#10;Description generated with high confidence">
             <a:extLst>
               <a:ext uri="{FF2B5EF4-FFF2-40B4-BE49-F238E27FC236}">
-                <a16:creationId xmlns:a16="http://schemas.microsoft.com/office/drawing/2014/main" id="{C7BC0718-3AEC-417A-BD8F-3A387BBF0481}"/>
+                <a16:creationId xmlns:a16="http://schemas.microsoft.com/office/drawing/2014/main" xmlns="" id="{C7BC0718-3AEC-417A-BD8F-3A387BBF0481}"/>
               </a:ext>
             </a:extLst>
           </p:cNvPr>
@@ -10265,7 +10380,7 @@
           <p:cNvPr id="28" name="Picture 70" descr="A screen shot of a computer&#10;&#10;Description generated with very high confidence">
             <a:extLst>
               <a:ext uri="{FF2B5EF4-FFF2-40B4-BE49-F238E27FC236}">
-                <a16:creationId xmlns:a16="http://schemas.microsoft.com/office/drawing/2014/main" id="{0CAA2E08-371C-4778-B698-82EA38A03D11}"/>
+                <a16:creationId xmlns:a16="http://schemas.microsoft.com/office/drawing/2014/main" xmlns="" id="{0CAA2E08-371C-4778-B698-82EA38A03D11}"/>
               </a:ext>
             </a:extLst>
           </p:cNvPr>
@@ -10295,7 +10410,7 @@
           <p:cNvPr id="29" name="Picture 73" descr="A close up of a logo&#10;&#10;Description generated with high confidence">
             <a:extLst>
               <a:ext uri="{FF2B5EF4-FFF2-40B4-BE49-F238E27FC236}">
-                <a16:creationId xmlns:a16="http://schemas.microsoft.com/office/drawing/2014/main" id="{385A0B54-3BDE-4902-8311-81E6A8A2E57E}"/>
+                <a16:creationId xmlns:a16="http://schemas.microsoft.com/office/drawing/2014/main" xmlns="" id="{385A0B54-3BDE-4902-8311-81E6A8A2E57E}"/>
               </a:ext>
             </a:extLst>
           </p:cNvPr>
@@ -10376,7 +10491,7 @@
           <p:cNvPr id="31" name="Picture 79" descr="A close up of a logo&#10;&#10;Description generated with very high confidence">
             <a:extLst>
               <a:ext uri="{FF2B5EF4-FFF2-40B4-BE49-F238E27FC236}">
-                <a16:creationId xmlns:a16="http://schemas.microsoft.com/office/drawing/2014/main" id="{7EA4B790-3FF9-4E6B-891E-C4B0A8AC7E5E}"/>
+                <a16:creationId xmlns:a16="http://schemas.microsoft.com/office/drawing/2014/main" xmlns="" id="{7EA4B790-3FF9-4E6B-891E-C4B0A8AC7E5E}"/>
               </a:ext>
             </a:extLst>
           </p:cNvPr>
@@ -10409,7 +10524,7 @@
           <p:cNvPr id="32" name="TextBox 88">
             <a:extLst>
               <a:ext uri="{FF2B5EF4-FFF2-40B4-BE49-F238E27FC236}">
-                <a16:creationId xmlns:a16="http://schemas.microsoft.com/office/drawing/2014/main" id="{194A1E76-091F-4A2D-A3A3-64B09C6107D4}"/>
+                <a16:creationId xmlns:a16="http://schemas.microsoft.com/office/drawing/2014/main" xmlns="" id="{194A1E76-091F-4A2D-A3A3-64B09C6107D4}"/>
               </a:ext>
             </a:extLst>
           </p:cNvPr>
@@ -10859,7 +10974,7 @@
           <p:cNvPr id="7" name="Título 1">
             <a:extLst>
               <a:ext uri="{FF2B5EF4-FFF2-40B4-BE49-F238E27FC236}">
-                <a16:creationId xmlns:a16="http://schemas.microsoft.com/office/drawing/2014/main" id="{99F76FBE-1BC2-4EE6-B90A-22263BF7BDCD}"/>
+                <a16:creationId xmlns:a16="http://schemas.microsoft.com/office/drawing/2014/main" xmlns="" id="{99F76FBE-1BC2-4EE6-B90A-22263BF7BDCD}"/>
               </a:ext>
             </a:extLst>
           </p:cNvPr>

</xml_diff>